<commit_message>
Added Mark's bio to storyboard.
</commit_message>
<xml_diff>
--- a/STTR AF13-AT08 Storyboard.pptx
+++ b/STTR AF13-AT08 Storyboard.pptx
@@ -5,7 +5,7 @@
     <p:sldMasterId id="2147483648" r:id="rId1"/>
   </p:sldMasterIdLst>
   <p:notesMasterIdLst>
-    <p:notesMasterId r:id="rId26"/>
+    <p:notesMasterId r:id="rId28"/>
   </p:notesMasterIdLst>
   <p:sldIdLst>
     <p:sldId id="256" r:id="rId2"/>
@@ -27,11 +27,13 @@
     <p:sldId id="263" r:id="rId18"/>
     <p:sldId id="264" r:id="rId19"/>
     <p:sldId id="265" r:id="rId20"/>
-    <p:sldId id="266" r:id="rId21"/>
-    <p:sldId id="267" r:id="rId22"/>
-    <p:sldId id="268" r:id="rId23"/>
-    <p:sldId id="279" r:id="rId24"/>
-    <p:sldId id="269" r:id="rId25"/>
+    <p:sldId id="280" r:id="rId21"/>
+    <p:sldId id="281" r:id="rId22"/>
+    <p:sldId id="266" r:id="rId23"/>
+    <p:sldId id="267" r:id="rId24"/>
+    <p:sldId id="268" r:id="rId25"/>
+    <p:sldId id="279" r:id="rId26"/>
+    <p:sldId id="269" r:id="rId27"/>
   </p:sldIdLst>
   <p:sldSz cx="9144000" cy="6858000" type="screen4x3"/>
   <p:notesSz cx="6858000" cy="9144000"/>
@@ -215,7 +217,7 @@
           <a:p>
             <a:fld id="{DFC186D9-6980-43A7-BCA1-0664D03143B5}" type="datetimeFigureOut">
               <a:rPr lang="en-US" smtClean="0"/>
-              <a:t>2/5/2013</a:t>
+              <a:t>2/17/2013</a:t>
             </a:fld>
             <a:endParaRPr lang="en-US"/>
           </a:p>
@@ -548,7 +550,7 @@
           <a:p>
             <a:fld id="{A1B8FA52-1B23-4882-B750-D6A6558BFC4A}" type="slidenum">
               <a:rPr lang="en-US" smtClean="0"/>
-              <a:t>22</a:t>
+              <a:t>24</a:t>
             </a:fld>
             <a:endParaRPr lang="en-US"/>
           </a:p>
@@ -748,7 +750,7 @@
           <a:p>
             <a:fld id="{6BC4C33C-B3E4-4F72-8835-A098BD8D6504}" type="datetime1">
               <a:rPr lang="en-US" smtClean="0"/>
-              <a:t>2/5/2013</a:t>
+              <a:t>2/17/2013</a:t>
             </a:fld>
             <a:endParaRPr lang="en-US"/>
           </a:p>
@@ -922,7 +924,7 @@
           <a:p>
             <a:fld id="{BCDD9C95-87C8-4B67-8A62-FADAA040CD03}" type="datetime1">
               <a:rPr lang="en-US" smtClean="0"/>
-              <a:t>2/5/2013</a:t>
+              <a:t>2/17/2013</a:t>
             </a:fld>
             <a:endParaRPr lang="en-US"/>
           </a:p>
@@ -1106,7 +1108,7 @@
           <a:p>
             <a:fld id="{EE6FD758-AC53-44D0-8767-F2EE1917D250}" type="datetime1">
               <a:rPr lang="en-US" smtClean="0"/>
-              <a:t>2/5/2013</a:t>
+              <a:t>2/17/2013</a:t>
             </a:fld>
             <a:endParaRPr lang="en-US"/>
           </a:p>
@@ -1280,7 +1282,7 @@
           <a:p>
             <a:fld id="{A967BCC1-E0E3-45C8-AB9A-D5F2077C4A3C}" type="datetime1">
               <a:rPr lang="en-US" smtClean="0"/>
-              <a:t>2/5/2013</a:t>
+              <a:t>2/17/2013</a:t>
             </a:fld>
             <a:endParaRPr lang="en-US"/>
           </a:p>
@@ -1530,7 +1532,7 @@
           <a:p>
             <a:fld id="{6CF85CC8-944F-478A-8F50-4AAC2A3EC468}" type="datetime1">
               <a:rPr lang="en-US" smtClean="0"/>
-              <a:t>2/5/2013</a:t>
+              <a:t>2/17/2013</a:t>
             </a:fld>
             <a:endParaRPr lang="en-US"/>
           </a:p>
@@ -1822,7 +1824,7 @@
           <a:p>
             <a:fld id="{893715DF-96D1-4342-A17F-18DBFFFF98A4}" type="datetime1">
               <a:rPr lang="en-US" smtClean="0"/>
-              <a:t>2/5/2013</a:t>
+              <a:t>2/17/2013</a:t>
             </a:fld>
             <a:endParaRPr lang="en-US"/>
           </a:p>
@@ -2248,7 +2250,7 @@
           <a:p>
             <a:fld id="{9147AA64-A3DF-48D9-BA92-F2EF866A3419}" type="datetime1">
               <a:rPr lang="en-US" smtClean="0"/>
-              <a:t>2/5/2013</a:t>
+              <a:t>2/17/2013</a:t>
             </a:fld>
             <a:endParaRPr lang="en-US"/>
           </a:p>
@@ -2370,7 +2372,7 @@
           <a:p>
             <a:fld id="{5421E0CD-C46D-469A-873F-FBC35F92804C}" type="datetime1">
               <a:rPr lang="en-US" smtClean="0"/>
-              <a:t>2/5/2013</a:t>
+              <a:t>2/17/2013</a:t>
             </a:fld>
             <a:endParaRPr lang="en-US"/>
           </a:p>
@@ -2469,7 +2471,7 @@
           <a:p>
             <a:fld id="{B23AF254-7D79-458C-A5F6-AFB33ADC18AA}" type="datetime1">
               <a:rPr lang="en-US" smtClean="0"/>
-              <a:t>2/5/2013</a:t>
+              <a:t>2/17/2013</a:t>
             </a:fld>
             <a:endParaRPr lang="en-US"/>
           </a:p>
@@ -2750,7 +2752,7 @@
           <a:p>
             <a:fld id="{01CF12DE-8377-4313-A9ED-C605A2885C5B}" type="datetime1">
               <a:rPr lang="en-US" smtClean="0"/>
-              <a:t>2/5/2013</a:t>
+              <a:t>2/17/2013</a:t>
             </a:fld>
             <a:endParaRPr lang="en-US"/>
           </a:p>
@@ -3007,7 +3009,7 @@
           <a:p>
             <a:fld id="{3E53D974-2184-423C-A381-2BFEAA3D4239}" type="datetime1">
               <a:rPr lang="en-US" smtClean="0"/>
-              <a:t>2/5/2013</a:t>
+              <a:t>2/17/2013</a:t>
             </a:fld>
             <a:endParaRPr lang="en-US"/>
           </a:p>
@@ -3224,7 +3226,7 @@
           <a:p>
             <a:fld id="{B92A54CA-42BF-4B1E-86CA-74377B426ED0}" type="datetime1">
               <a:rPr lang="en-US" smtClean="0"/>
-              <a:t>2/5/2013</a:t>
+              <a:t>2/17/2013</a:t>
             </a:fld>
             <a:endParaRPr lang="en-US"/>
           </a:p>
@@ -4271,21 +4273,8 @@
                   <a:srgbClr val="0070C0"/>
                 </a:solidFill>
               </a:rPr>
-              <a:t>This section should be a substantial portion of the Technical Volume section</a:t>
-            </a:r>
-            <a:r>
-              <a:rPr lang="en-US" i="1" dirty="0" smtClean="0">
-                <a:solidFill>
-                  <a:srgbClr val="0070C0"/>
-                </a:solidFill>
-              </a:rPr>
-              <a:t>.</a:t>
-            </a:r>
-            <a:endParaRPr lang="en-US" i="1" dirty="0" smtClean="0">
-              <a:solidFill>
-                <a:srgbClr val="0070C0"/>
-              </a:solidFill>
-            </a:endParaRPr>
+              <a:t>This section should be a substantial portion of the Technical Volume section.</a:t>
+            </a:r>
           </a:p>
         </p:txBody>
       </p:sp>
@@ -4634,15 +4623,7 @@
           <a:p>
             <a:r>
               <a:rPr lang="en-US" dirty="0" smtClean="0"/>
-              <a:t>STTR </a:t>
-            </a:r>
-            <a:r>
-              <a:rPr lang="en-US" dirty="0" smtClean="0"/>
-              <a:t>AF13-AT08 </a:t>
-            </a:r>
-            <a:r>
-              <a:rPr lang="en-US" dirty="0" smtClean="0"/>
-              <a:t>Storyboard</a:t>
+              <a:t>STTR AF13-AT08 Storyboard</a:t>
             </a:r>
             <a:endParaRPr lang="en-US" dirty="0"/>
           </a:p>
@@ -5331,11 +5312,7 @@
             </a:r>
             <a:r>
               <a:rPr lang="en-US" dirty="0" smtClean="0"/>
-              <a:t>resume</a:t>
-            </a:r>
-            <a:r>
-              <a:rPr lang="en-US" dirty="0" smtClean="0"/>
-              <a:t>.</a:t>
+              <a:t>resume.</a:t>
             </a:r>
             <a:endParaRPr lang="en-US" dirty="0"/>
           </a:p>
@@ -5674,8 +5651,12 @@
           <a:lstStyle/>
           <a:p>
             <a:r>
-              <a:rPr lang="en-US" dirty="0" smtClean="0"/>
-              <a:t>Foreign Citizens</a:t>
+              <a:rPr lang="en-US" dirty="0"/>
+              <a:t>Key </a:t>
+            </a:r>
+            <a:r>
+              <a:rPr lang="en-US" dirty="0" smtClean="0"/>
+              <a:t>Personnel (cont.)</a:t>
             </a:r>
             <a:endParaRPr lang="en-US" dirty="0"/>
           </a:p>
@@ -5694,40 +5675,90 @@
         <p:spPr/>
         <p:txBody>
           <a:bodyPr>
-            <a:normAutofit fontScale="92500" lnSpcReduction="20000"/>
+            <a:normAutofit fontScale="85000" lnSpcReduction="20000"/>
           </a:bodyPr>
           <a:lstStyle/>
           <a:p>
-            <a:r>
-              <a:rPr lang="en-US" i="1" dirty="0" smtClean="0">
-                <a:solidFill>
-                  <a:srgbClr val="0070C0"/>
-                </a:solidFill>
-              </a:rPr>
-              <a:t>Identify any foreign citizens or individuals holding dual citizenship expected to be involved on this project as a direct employee, subcontractor, or consultant.</a:t>
-            </a:r>
-          </a:p>
-          <a:p>
-            <a:r>
-              <a:rPr lang="en-US" i="1" dirty="0" smtClean="0">
-                <a:solidFill>
-                  <a:srgbClr val="0070C0"/>
-                </a:solidFill>
-              </a:rPr>
-              <a:t>For these individuals, please specify their country of origin, the type of visa or work permit under which they are performing and an explanation of their anticipated level of involvement on this project.</a:t>
-            </a:r>
-          </a:p>
-          <a:p>
+            <a:pPr marL="0" indent="0">
+              <a:buNone/>
+            </a:pPr>
+            <a:r>
+              <a:rPr lang="en-US" b="1" dirty="0" smtClean="0"/>
+              <a:t>PRINCIPAL INVESTIGATOR (PI)</a:t>
+            </a:r>
+            <a:r>
+              <a:rPr lang="en-US" dirty="0" smtClean="0"/>
+              <a:t>. </a:t>
+            </a:r>
             <a:r>
               <a:rPr lang="en-US" dirty="0"/>
-              <a:t>We do not expect to involve any foreign citizens on this project.</a:t>
-            </a:r>
-          </a:p>
-        </p:txBody>
-      </p:sp>
-      <p:sp>
-        <p:nvSpPr>
-          <p:cNvPr id="4" name="Slide Number Placeholder 3"/>
+              <a:t>Dr. Mark Heileman is a </a:t>
+            </a:r>
+            <a:r>
+              <a:rPr lang="en-US" dirty="0" smtClean="0"/>
+              <a:t>PI at AHS Engineering Services. </a:t>
+            </a:r>
+            <a:r>
+              <a:rPr lang="en-US" dirty="0"/>
+              <a:t>Dr. </a:t>
+            </a:r>
+            <a:r>
+              <a:rPr lang="en-US" dirty="0" err="1"/>
+              <a:t>Heileman’s</a:t>
+            </a:r>
+            <a:r>
+              <a:rPr lang="en-US" dirty="0"/>
+              <a:t> over thirty-year career includes engineering and executive positions with </a:t>
+            </a:r>
+            <a:r>
+              <a:rPr lang="en-US" dirty="0" smtClean="0"/>
+              <a:t>Modus Operandi, </a:t>
+            </a:r>
+            <a:r>
+              <a:rPr lang="en-US" dirty="0" err="1" smtClean="0"/>
+              <a:t>Elisar</a:t>
+            </a:r>
+            <a:r>
+              <a:rPr lang="en-US" dirty="0" smtClean="0"/>
+              <a:t> </a:t>
+            </a:r>
+            <a:r>
+              <a:rPr lang="en-US" dirty="0"/>
+              <a:t>Software Corporation, i2 Technologies, United Space Alliance, Rockwell International, and Harris Corporation. His mission is to focus on the client’s challenges and employ a consultative, systems engineering approach to solve complex business needs. Dr. Heileman is a graduate of the University of Central Florida where he earned a Ph.D. in Industrial Engineering and Management Systems. He is a registered professional engineer in Florida</a:t>
+            </a:r>
+            <a:r>
+              <a:rPr lang="en-US" dirty="0" smtClean="0"/>
+              <a:t>.</a:t>
+            </a:r>
+          </a:p>
+        </p:txBody>
+      </p:sp>
+      <p:sp>
+        <p:nvSpPr>
+          <p:cNvPr id="4" name="Footer Placeholder 3"/>
+          <p:cNvSpPr>
+            <a:spLocks noGrp="1"/>
+          </p:cNvSpPr>
+          <p:nvPr>
+            <p:ph type="ftr" sz="quarter" idx="11"/>
+          </p:nvPr>
+        </p:nvSpPr>
+        <p:spPr/>
+        <p:txBody>
+          <a:bodyPr/>
+          <a:lstStyle/>
+          <a:p>
+            <a:r>
+              <a:rPr lang="en-US" smtClean="0"/>
+              <a:t>STTR AF13-AT08 Storyboard</a:t>
+            </a:r>
+            <a:endParaRPr lang="en-US"/>
+          </a:p>
+        </p:txBody>
+      </p:sp>
+      <p:sp>
+        <p:nvSpPr>
+          <p:cNvPr id="5" name="Slide Number Placeholder 4"/>
           <p:cNvSpPr>
             <a:spLocks noGrp="1"/>
           </p:cNvSpPr>
@@ -5744,29 +5775,6 @@
               <a:rPr lang="en-US" smtClean="0"/>
               <a:t>20</a:t>
             </a:fld>
-            <a:endParaRPr lang="en-US"/>
-          </a:p>
-        </p:txBody>
-      </p:sp>
-      <p:sp>
-        <p:nvSpPr>
-          <p:cNvPr id="6" name="Footer Placeholder 5"/>
-          <p:cNvSpPr>
-            <a:spLocks noGrp="1"/>
-          </p:cNvSpPr>
-          <p:nvPr>
-            <p:ph type="ftr" sz="quarter" idx="11"/>
-          </p:nvPr>
-        </p:nvSpPr>
-        <p:spPr/>
-        <p:txBody>
-          <a:bodyPr/>
-          <a:lstStyle/>
-          <a:p>
-            <a:r>
-              <a:rPr lang="en-US" smtClean="0"/>
-              <a:t>STTR AF13-AT08 Storyboard</a:t>
-            </a:r>
             <a:endParaRPr lang="en-US"/>
           </a:p>
         </p:txBody>
@@ -5774,20 +5782,13 @@
     </p:spTree>
     <p:extLst>
       <p:ext uri="{BB962C8B-B14F-4D97-AF65-F5344CB8AC3E}">
-        <p14:creationId xmlns:p14="http://schemas.microsoft.com/office/powerpoint/2010/main" val="1134157551"/>
+        <p14:creationId xmlns:p14="http://schemas.microsoft.com/office/powerpoint/2010/main" val="2503896954"/>
       </p:ext>
     </p:extLst>
   </p:cSld>
   <p:clrMapOvr>
     <a:masterClrMapping/>
   </p:clrMapOvr>
-  <p:timing>
-    <p:tnLst>
-      <p:par>
-        <p:cTn id="1" dur="indefinite" restart="never" nodeType="tmRoot"/>
-      </p:par>
-    </p:tnLst>
-  </p:timing>
 </p:sld>
 </file>
 
@@ -5824,8 +5825,30 @@
           <a:lstStyle/>
           <a:p>
             <a:r>
-              <a:rPr lang="en-US" dirty="0" smtClean="0"/>
-              <a:t>Facilities/Equipment</a:t>
+              <a:rPr lang="en-US" dirty="0"/>
+              <a:t>Key Personnel (cont.)</a:t>
+            </a:r>
+          </a:p>
+        </p:txBody>
+      </p:sp>
+      <p:sp>
+        <p:nvSpPr>
+          <p:cNvPr id="3" name="Content Placeholder 2"/>
+          <p:cNvSpPr>
+            <a:spLocks noGrp="1"/>
+          </p:cNvSpPr>
+          <p:nvPr>
+            <p:ph idx="1"/>
+          </p:nvPr>
+        </p:nvSpPr>
+        <p:spPr/>
+        <p:txBody>
+          <a:bodyPr/>
+          <a:lstStyle/>
+          <a:p>
+            <a:r>
+              <a:rPr lang="en-US" dirty="0" smtClean="0"/>
+              <a:t>Mark’s resume TBD.</a:t>
             </a:r>
             <a:endParaRPr lang="en-US" dirty="0"/>
           </a:p>
@@ -5833,62 +5856,30 @@
       </p:sp>
       <p:sp>
         <p:nvSpPr>
-          <p:cNvPr id="3" name="Content Placeholder 2"/>
-          <p:cNvSpPr>
-            <a:spLocks noGrp="1"/>
-          </p:cNvSpPr>
-          <p:nvPr>
-            <p:ph idx="1"/>
-          </p:nvPr>
-        </p:nvSpPr>
-        <p:spPr/>
-        <p:txBody>
-          <a:bodyPr>
-            <a:normAutofit fontScale="92500" lnSpcReduction="10000"/>
-          </a:bodyPr>
-          <a:lstStyle/>
-          <a:p>
-            <a:r>
-              <a:rPr lang="en-US" i="1" dirty="0" smtClean="0">
-                <a:solidFill>
-                  <a:srgbClr val="0070C0"/>
-                </a:solidFill>
-              </a:rPr>
-              <a:t>Describe available instrumentation and physical facilities necessary to carry out the Phase I effort.</a:t>
-            </a:r>
-          </a:p>
-          <a:p>
-            <a:r>
-              <a:rPr lang="en-US" i="1" dirty="0" smtClean="0">
-                <a:solidFill>
-                  <a:srgbClr val="0070C0"/>
-                </a:solidFill>
-              </a:rPr>
-              <a:t>Justify equipment purchases in this section and include detailed pricing information in the cost volume.</a:t>
-            </a:r>
-          </a:p>
-          <a:p>
-            <a:r>
-              <a:rPr lang="en-US" i="1" dirty="0" smtClean="0">
-                <a:solidFill>
-                  <a:srgbClr val="0070C0"/>
-                </a:solidFill>
-              </a:rPr>
-              <a:t>State whether or not the facilities where the proposed work will be performed meet environmental laws and regulations of federal, state (name), and local Governments.</a:t>
-            </a:r>
-          </a:p>
-          <a:p>
-            <a:r>
-              <a:rPr lang="en-US" dirty="0" smtClean="0"/>
-              <a:t>TBD.</a:t>
-            </a:r>
-            <a:endParaRPr lang="en-US" dirty="0"/>
-          </a:p>
-        </p:txBody>
-      </p:sp>
-      <p:sp>
-        <p:nvSpPr>
-          <p:cNvPr id="4" name="Slide Number Placeholder 3"/>
+          <p:cNvPr id="4" name="Footer Placeholder 3"/>
+          <p:cNvSpPr>
+            <a:spLocks noGrp="1"/>
+          </p:cNvSpPr>
+          <p:nvPr>
+            <p:ph type="ftr" sz="quarter" idx="11"/>
+          </p:nvPr>
+        </p:nvSpPr>
+        <p:spPr/>
+        <p:txBody>
+          <a:bodyPr/>
+          <a:lstStyle/>
+          <a:p>
+            <a:r>
+              <a:rPr lang="en-US" smtClean="0"/>
+              <a:t>STTR AF13-AT08 Storyboard</a:t>
+            </a:r>
+            <a:endParaRPr lang="en-US"/>
+          </a:p>
+        </p:txBody>
+      </p:sp>
+      <p:sp>
+        <p:nvSpPr>
+          <p:cNvPr id="5" name="Slide Number Placeholder 4"/>
           <p:cNvSpPr>
             <a:spLocks noGrp="1"/>
           </p:cNvSpPr>
@@ -5905,29 +5896,6 @@
               <a:rPr lang="en-US" smtClean="0"/>
               <a:t>21</a:t>
             </a:fld>
-            <a:endParaRPr lang="en-US"/>
-          </a:p>
-        </p:txBody>
-      </p:sp>
-      <p:sp>
-        <p:nvSpPr>
-          <p:cNvPr id="6" name="Footer Placeholder 5"/>
-          <p:cNvSpPr>
-            <a:spLocks noGrp="1"/>
-          </p:cNvSpPr>
-          <p:nvPr>
-            <p:ph type="ftr" sz="quarter" idx="11"/>
-          </p:nvPr>
-        </p:nvSpPr>
-        <p:spPr/>
-        <p:txBody>
-          <a:bodyPr/>
-          <a:lstStyle/>
-          <a:p>
-            <a:r>
-              <a:rPr lang="en-US" smtClean="0"/>
-              <a:t>STTR AF13-AT08 Storyboard</a:t>
-            </a:r>
             <a:endParaRPr lang="en-US"/>
           </a:p>
         </p:txBody>
@@ -5935,20 +5903,13 @@
     </p:spTree>
     <p:extLst>
       <p:ext uri="{BB962C8B-B14F-4D97-AF65-F5344CB8AC3E}">
-        <p14:creationId xmlns:p14="http://schemas.microsoft.com/office/powerpoint/2010/main" val="220629874"/>
+        <p14:creationId xmlns:p14="http://schemas.microsoft.com/office/powerpoint/2010/main" val="1557301556"/>
       </p:ext>
     </p:extLst>
   </p:cSld>
   <p:clrMapOvr>
     <a:masterClrMapping/>
   </p:clrMapOvr>
-  <p:timing>
-    <p:tnLst>
-      <p:par>
-        <p:cTn id="1" dur="indefinite" restart="never" nodeType="tmRoot"/>
-      </p:par>
-    </p:tnLst>
-  </p:timing>
 </p:sld>
 </file>
 
@@ -5986,7 +5947,7 @@
           <a:p>
             <a:r>
               <a:rPr lang="en-US" dirty="0" smtClean="0"/>
-              <a:t>Subcontractors/Consultants</a:t>
+              <a:t>Foreign Citizens</a:t>
             </a:r>
             <a:endParaRPr lang="en-US" dirty="0"/>
           </a:p>
@@ -6005,7 +5966,7 @@
         <p:spPr/>
         <p:txBody>
           <a:bodyPr>
-            <a:normAutofit fontScale="70000" lnSpcReduction="20000"/>
+            <a:normAutofit fontScale="92500" lnSpcReduction="20000"/>
           </a:bodyPr>
           <a:lstStyle/>
           <a:p>
@@ -6015,7 +5976,7 @@
                   <a:srgbClr val="0070C0"/>
                 </a:solidFill>
               </a:rPr>
-              <a:t>Involvement of a research institution in the project is required and the institution should be identified and described according to the Cost Breakdown Guidance.</a:t>
+              <a:t>Identify any foreign citizens or individuals holding dual citizenship expected to be involved on this project as a direct employee, subcontractor, or consultant.</a:t>
             </a:r>
           </a:p>
           <a:p>
@@ -6025,51 +5986,14 @@
                   <a:srgbClr val="0070C0"/>
                 </a:solidFill>
               </a:rPr>
-              <a:t>A minimum of 40% of the research and/or analytical work in Phase I, as measured by direct and indirect costs, must be carried out by the proposing firm.</a:t>
-            </a:r>
-          </a:p>
-          <a:p>
-            <a:r>
-              <a:rPr lang="en-US" i="1" dirty="0" smtClean="0">
-                <a:solidFill>
-                  <a:srgbClr val="0070C0"/>
-                </a:solidFill>
-              </a:rPr>
-              <a:t>STTR efforts may include subcontracts with Federal Laboratories and Federally Funded Research and Development Centers (FFRDCs).</a:t>
-            </a:r>
-          </a:p>
-          <a:p>
-            <a:r>
-              <a:rPr lang="en-US" i="1" dirty="0" smtClean="0">
-                <a:solidFill>
-                  <a:srgbClr val="0070C0"/>
-                </a:solidFill>
-              </a:rPr>
-              <a:t>A waiver is no longer required for the use of federal laboratories and FFRDCs; however, proposers must certify their use of such facilities on the Cover Sheet of the proposal.</a:t>
-            </a:r>
-          </a:p>
-          <a:p>
-            <a:r>
-              <a:rPr lang="en-US" i="1" dirty="0" smtClean="0">
-                <a:solidFill>
-                  <a:srgbClr val="0070C0"/>
-                </a:solidFill>
-              </a:rPr>
-              <a:t>Subcontracts with other federal organizations are not permitted</a:t>
-            </a:r>
-            <a:r>
-              <a:rPr lang="en-US" i="1" dirty="0" smtClean="0">
-                <a:solidFill>
-                  <a:srgbClr val="0070C0"/>
-                </a:solidFill>
-              </a:rPr>
-              <a:t>.</a:t>
-            </a:r>
-            <a:endParaRPr lang="en-US" i="1" dirty="0" smtClean="0">
-              <a:solidFill>
-                <a:srgbClr val="0070C0"/>
-              </a:solidFill>
-            </a:endParaRPr>
+              <a:t>For these individuals, please specify their country of origin, the type of visa or work permit under which they are performing and an explanation of their anticipated level of involvement on this project.</a:t>
+            </a:r>
+          </a:p>
+          <a:p>
+            <a:r>
+              <a:rPr lang="en-US" dirty="0"/>
+              <a:t>We do not expect to involve any foreign citizens on this project.</a:t>
+            </a:r>
           </a:p>
         </p:txBody>
       </p:sp>
@@ -6122,7 +6046,7 @@
     </p:spTree>
     <p:extLst>
       <p:ext uri="{BB962C8B-B14F-4D97-AF65-F5344CB8AC3E}">
-        <p14:creationId xmlns:p14="http://schemas.microsoft.com/office/powerpoint/2010/main" val="3390218443"/>
+        <p14:creationId xmlns:p14="http://schemas.microsoft.com/office/powerpoint/2010/main" val="1134157551"/>
       </p:ext>
     </p:extLst>
   </p:cSld>
@@ -6173,7 +6097,7 @@
           <a:p>
             <a:r>
               <a:rPr lang="en-US" dirty="0" smtClean="0"/>
-              <a:t>Subcontractors/Consultants (cont.)</a:t>
+              <a:t>Facilities/Equipment</a:t>
             </a:r>
             <a:endParaRPr lang="en-US" dirty="0"/>
           </a:p>
@@ -6191,94 +6115,52 @@
         </p:nvSpPr>
         <p:spPr/>
         <p:txBody>
-          <a:bodyPr/>
-          <a:lstStyle/>
-          <a:p>
-            <a:r>
-              <a:rPr lang="en-US" dirty="0"/>
-              <a:t>UNM</a:t>
-            </a:r>
-            <a:r>
-              <a:rPr lang="en-US" dirty="0" smtClean="0"/>
-              <a:t>.</a:t>
-            </a:r>
-          </a:p>
-          <a:p>
-            <a:pPr lvl="1"/>
-            <a:r>
-              <a:rPr lang="en-US" dirty="0" smtClean="0"/>
-              <a:t>Co-PI: Greg.</a:t>
-            </a:r>
-          </a:p>
-          <a:p>
-            <a:pPr lvl="1"/>
-            <a:r>
-              <a:rPr lang="en-US" dirty="0" smtClean="0"/>
-              <a:t>Bio and resume.</a:t>
+          <a:bodyPr>
+            <a:normAutofit fontScale="92500" lnSpcReduction="10000"/>
+          </a:bodyPr>
+          <a:lstStyle/>
+          <a:p>
+            <a:r>
+              <a:rPr lang="en-US" i="1" dirty="0" smtClean="0">
+                <a:solidFill>
+                  <a:srgbClr val="0070C0"/>
+                </a:solidFill>
+              </a:rPr>
+              <a:t>Describe available instrumentation and physical facilities necessary to carry out the Phase I effort.</a:t>
+            </a:r>
+          </a:p>
+          <a:p>
+            <a:r>
+              <a:rPr lang="en-US" i="1" dirty="0" smtClean="0">
+                <a:solidFill>
+                  <a:srgbClr val="0070C0"/>
+                </a:solidFill>
+              </a:rPr>
+              <a:t>Justify equipment purchases in this section and include detailed pricing information in the cost volume.</a:t>
+            </a:r>
+          </a:p>
+          <a:p>
+            <a:r>
+              <a:rPr lang="en-US" i="1" dirty="0" smtClean="0">
+                <a:solidFill>
+                  <a:srgbClr val="0070C0"/>
+                </a:solidFill>
+              </a:rPr>
+              <a:t>State whether or not the facilities where the proposed work will be performed meet environmental laws and regulations of federal, state (name), and local Governments.</a:t>
+            </a:r>
+          </a:p>
+          <a:p>
+            <a:r>
+              <a:rPr lang="en-US" dirty="0" smtClean="0"/>
+              <a:t>TBD.</a:t>
             </a:r>
             <a:endParaRPr lang="en-US" dirty="0"/>
           </a:p>
-          <a:p>
-            <a:r>
-              <a:rPr lang="en-US" dirty="0"/>
-              <a:t>Sandia National Laboratories</a:t>
-            </a:r>
-            <a:r>
-              <a:rPr lang="en-US" dirty="0" smtClean="0"/>
-              <a:t>.</a:t>
-            </a:r>
-          </a:p>
-          <a:p>
-            <a:pPr lvl="1"/>
-            <a:r>
-              <a:rPr lang="en-US" dirty="0" smtClean="0"/>
-              <a:t>Co-PI: Chris.</a:t>
-            </a:r>
-          </a:p>
-          <a:p>
-            <a:pPr lvl="1"/>
-            <a:r>
-              <a:rPr lang="en-US" dirty="0" smtClean="0"/>
-              <a:t>Bio and resume.</a:t>
-            </a:r>
-            <a:endParaRPr lang="en-US" dirty="0"/>
-          </a:p>
-        </p:txBody>
-      </p:sp>
-      <p:sp>
-        <p:nvSpPr>
-          <p:cNvPr id="4" name="Footer Placeholder 3"/>
-          <p:cNvSpPr>
-            <a:spLocks noGrp="1"/>
-          </p:cNvSpPr>
-          <p:nvPr>
-            <p:ph type="ftr" sz="quarter" idx="11"/>
-          </p:nvPr>
-        </p:nvSpPr>
-        <p:spPr/>
-        <p:txBody>
-          <a:bodyPr/>
-          <a:lstStyle/>
-          <a:p>
-            <a:r>
-              <a:rPr lang="en-US" dirty="0" smtClean="0"/>
-              <a:t>STTR </a:t>
-            </a:r>
-            <a:r>
-              <a:rPr lang="en-US" dirty="0" smtClean="0"/>
-              <a:t>AF13-AT08 </a:t>
-            </a:r>
-            <a:r>
-              <a:rPr lang="en-US" dirty="0" smtClean="0"/>
-              <a:t>Storyboard</a:t>
-            </a:r>
-            <a:endParaRPr lang="en-US" dirty="0"/>
-          </a:p>
-        </p:txBody>
-      </p:sp>
-      <p:sp>
-        <p:nvSpPr>
-          <p:cNvPr id="5" name="Slide Number Placeholder 4"/>
+        </p:txBody>
+      </p:sp>
+      <p:sp>
+        <p:nvSpPr>
+          <p:cNvPr id="4" name="Slide Number Placeholder 3"/>
           <p:cNvSpPr>
             <a:spLocks noGrp="1"/>
           </p:cNvSpPr>
@@ -6295,6 +6177,29 @@
               <a:rPr lang="en-US" smtClean="0"/>
               <a:t>23</a:t>
             </a:fld>
+            <a:endParaRPr lang="en-US"/>
+          </a:p>
+        </p:txBody>
+      </p:sp>
+      <p:sp>
+        <p:nvSpPr>
+          <p:cNvPr id="6" name="Footer Placeholder 5"/>
+          <p:cNvSpPr>
+            <a:spLocks noGrp="1"/>
+          </p:cNvSpPr>
+          <p:nvPr>
+            <p:ph type="ftr" sz="quarter" idx="11"/>
+          </p:nvPr>
+        </p:nvSpPr>
+        <p:spPr/>
+        <p:txBody>
+          <a:bodyPr/>
+          <a:lstStyle/>
+          <a:p>
+            <a:r>
+              <a:rPr lang="en-US" smtClean="0"/>
+              <a:t>STTR AF13-AT08 Storyboard</a:t>
+            </a:r>
             <a:endParaRPr lang="en-US"/>
           </a:p>
         </p:txBody>
@@ -6302,7 +6207,7 @@
     </p:spTree>
     <p:extLst>
       <p:ext uri="{BB962C8B-B14F-4D97-AF65-F5344CB8AC3E}">
-        <p14:creationId xmlns:p14="http://schemas.microsoft.com/office/powerpoint/2010/main" val="1359215833"/>
+        <p14:creationId xmlns:p14="http://schemas.microsoft.com/office/powerpoint/2010/main" val="220629874"/>
       </p:ext>
     </p:extLst>
   </p:cSld>
@@ -6348,6 +6253,352 @@
         </p:nvSpPr>
         <p:spPr/>
         <p:txBody>
+          <a:bodyPr/>
+          <a:lstStyle/>
+          <a:p>
+            <a:r>
+              <a:rPr lang="en-US" dirty="0" smtClean="0"/>
+              <a:t>Subcontractors/Consultants</a:t>
+            </a:r>
+            <a:endParaRPr lang="en-US" dirty="0"/>
+          </a:p>
+        </p:txBody>
+      </p:sp>
+      <p:sp>
+        <p:nvSpPr>
+          <p:cNvPr id="3" name="Content Placeholder 2"/>
+          <p:cNvSpPr>
+            <a:spLocks noGrp="1"/>
+          </p:cNvSpPr>
+          <p:nvPr>
+            <p:ph idx="1"/>
+          </p:nvPr>
+        </p:nvSpPr>
+        <p:spPr/>
+        <p:txBody>
+          <a:bodyPr>
+            <a:normAutofit fontScale="70000" lnSpcReduction="20000"/>
+          </a:bodyPr>
+          <a:lstStyle/>
+          <a:p>
+            <a:r>
+              <a:rPr lang="en-US" i="1" dirty="0" smtClean="0">
+                <a:solidFill>
+                  <a:srgbClr val="0070C0"/>
+                </a:solidFill>
+              </a:rPr>
+              <a:t>Involvement of a research institution in the project is required and the institution should be identified and described according to the Cost Breakdown Guidance.</a:t>
+            </a:r>
+          </a:p>
+          <a:p>
+            <a:r>
+              <a:rPr lang="en-US" i="1" dirty="0" smtClean="0">
+                <a:solidFill>
+                  <a:srgbClr val="0070C0"/>
+                </a:solidFill>
+              </a:rPr>
+              <a:t>A minimum of 40% of the research and/or analytical work in Phase I, as measured by direct and indirect costs, must be carried out by the proposing firm.</a:t>
+            </a:r>
+          </a:p>
+          <a:p>
+            <a:r>
+              <a:rPr lang="en-US" i="1" dirty="0" smtClean="0">
+                <a:solidFill>
+                  <a:srgbClr val="0070C0"/>
+                </a:solidFill>
+              </a:rPr>
+              <a:t>STTR efforts may include subcontracts with Federal Laboratories and Federally Funded Research and Development Centers (FFRDCs).</a:t>
+            </a:r>
+          </a:p>
+          <a:p>
+            <a:r>
+              <a:rPr lang="en-US" i="1" dirty="0" smtClean="0">
+                <a:solidFill>
+                  <a:srgbClr val="0070C0"/>
+                </a:solidFill>
+              </a:rPr>
+              <a:t>A waiver is no longer required for the use of federal laboratories and FFRDCs; however, proposers must certify their use of such facilities on the Cover Sheet of the proposal.</a:t>
+            </a:r>
+          </a:p>
+          <a:p>
+            <a:r>
+              <a:rPr lang="en-US" i="1" dirty="0" smtClean="0">
+                <a:solidFill>
+                  <a:srgbClr val="0070C0"/>
+                </a:solidFill>
+              </a:rPr>
+              <a:t>Subcontracts with other federal organizations are not permitted.</a:t>
+            </a:r>
+          </a:p>
+        </p:txBody>
+      </p:sp>
+      <p:sp>
+        <p:nvSpPr>
+          <p:cNvPr id="4" name="Slide Number Placeholder 3"/>
+          <p:cNvSpPr>
+            <a:spLocks noGrp="1"/>
+          </p:cNvSpPr>
+          <p:nvPr>
+            <p:ph type="sldNum" sz="quarter" idx="12"/>
+          </p:nvPr>
+        </p:nvSpPr>
+        <p:spPr/>
+        <p:txBody>
+          <a:bodyPr/>
+          <a:lstStyle/>
+          <a:p>
+            <a:fld id="{61793996-2A25-4CAE-9F26-AD44D986CDD6}" type="slidenum">
+              <a:rPr lang="en-US" smtClean="0"/>
+              <a:t>24</a:t>
+            </a:fld>
+            <a:endParaRPr lang="en-US"/>
+          </a:p>
+        </p:txBody>
+      </p:sp>
+      <p:sp>
+        <p:nvSpPr>
+          <p:cNvPr id="6" name="Footer Placeholder 5"/>
+          <p:cNvSpPr>
+            <a:spLocks noGrp="1"/>
+          </p:cNvSpPr>
+          <p:nvPr>
+            <p:ph type="ftr" sz="quarter" idx="11"/>
+          </p:nvPr>
+        </p:nvSpPr>
+        <p:spPr/>
+        <p:txBody>
+          <a:bodyPr/>
+          <a:lstStyle/>
+          <a:p>
+            <a:r>
+              <a:rPr lang="en-US" smtClean="0"/>
+              <a:t>STTR AF13-AT08 Storyboard</a:t>
+            </a:r>
+            <a:endParaRPr lang="en-US"/>
+          </a:p>
+        </p:txBody>
+      </p:sp>
+    </p:spTree>
+    <p:extLst>
+      <p:ext uri="{BB962C8B-B14F-4D97-AF65-F5344CB8AC3E}">
+        <p14:creationId xmlns:p14="http://schemas.microsoft.com/office/powerpoint/2010/main" val="3390218443"/>
+      </p:ext>
+    </p:extLst>
+  </p:cSld>
+  <p:clrMapOvr>
+    <a:masterClrMapping/>
+  </p:clrMapOvr>
+  <p:timing>
+    <p:tnLst>
+      <p:par>
+        <p:cTn id="1" dur="indefinite" restart="never" nodeType="tmRoot"/>
+      </p:par>
+    </p:tnLst>
+  </p:timing>
+</p:sld>
+</file>
+
+<file path=ppt/slides/slide25.xml><?xml version="1.0" encoding="utf-8"?>
+<p:sld xmlns:a="http://schemas.openxmlformats.org/drawingml/2006/main" xmlns:r="http://schemas.openxmlformats.org/officeDocument/2006/relationships" xmlns:p="http://schemas.openxmlformats.org/presentationml/2006/main">
+  <p:cSld>
+    <p:spTree>
+      <p:nvGrpSpPr>
+        <p:cNvPr id="1" name=""/>
+        <p:cNvGrpSpPr/>
+        <p:nvPr/>
+      </p:nvGrpSpPr>
+      <p:grpSpPr>
+        <a:xfrm>
+          <a:off x="0" y="0"/>
+          <a:ext cx="0" cy="0"/>
+          <a:chOff x="0" y="0"/>
+          <a:chExt cx="0" cy="0"/>
+        </a:xfrm>
+      </p:grpSpPr>
+      <p:sp>
+        <p:nvSpPr>
+          <p:cNvPr id="2" name="Title 1"/>
+          <p:cNvSpPr>
+            <a:spLocks noGrp="1"/>
+          </p:cNvSpPr>
+          <p:nvPr>
+            <p:ph type="title"/>
+          </p:nvPr>
+        </p:nvSpPr>
+        <p:spPr/>
+        <p:txBody>
+          <a:bodyPr/>
+          <a:lstStyle/>
+          <a:p>
+            <a:r>
+              <a:rPr lang="en-US" dirty="0" smtClean="0"/>
+              <a:t>Subcontractors/Consultants (cont.)</a:t>
+            </a:r>
+            <a:endParaRPr lang="en-US" dirty="0"/>
+          </a:p>
+        </p:txBody>
+      </p:sp>
+      <p:sp>
+        <p:nvSpPr>
+          <p:cNvPr id="3" name="Content Placeholder 2"/>
+          <p:cNvSpPr>
+            <a:spLocks noGrp="1"/>
+          </p:cNvSpPr>
+          <p:nvPr>
+            <p:ph idx="1"/>
+          </p:nvPr>
+        </p:nvSpPr>
+        <p:spPr/>
+        <p:txBody>
+          <a:bodyPr/>
+          <a:lstStyle/>
+          <a:p>
+            <a:r>
+              <a:rPr lang="en-US" dirty="0"/>
+              <a:t>UNM</a:t>
+            </a:r>
+            <a:r>
+              <a:rPr lang="en-US" dirty="0" smtClean="0"/>
+              <a:t>.</a:t>
+            </a:r>
+          </a:p>
+          <a:p>
+            <a:pPr lvl="1"/>
+            <a:r>
+              <a:rPr lang="en-US" dirty="0" smtClean="0"/>
+              <a:t>Co-PI: Greg.</a:t>
+            </a:r>
+          </a:p>
+          <a:p>
+            <a:pPr lvl="1"/>
+            <a:r>
+              <a:rPr lang="en-US" dirty="0" smtClean="0"/>
+              <a:t>Bio and resume.</a:t>
+            </a:r>
+            <a:endParaRPr lang="en-US" dirty="0"/>
+          </a:p>
+          <a:p>
+            <a:r>
+              <a:rPr lang="en-US" dirty="0"/>
+              <a:t>Sandia National Laboratories</a:t>
+            </a:r>
+            <a:r>
+              <a:rPr lang="en-US" dirty="0" smtClean="0"/>
+              <a:t>.</a:t>
+            </a:r>
+          </a:p>
+          <a:p>
+            <a:pPr lvl="1"/>
+            <a:r>
+              <a:rPr lang="en-US" dirty="0" smtClean="0"/>
+              <a:t>Co-PI: Chris.</a:t>
+            </a:r>
+          </a:p>
+          <a:p>
+            <a:pPr lvl="1"/>
+            <a:r>
+              <a:rPr lang="en-US" dirty="0" smtClean="0"/>
+              <a:t>Bio and resume.</a:t>
+            </a:r>
+            <a:endParaRPr lang="en-US" dirty="0"/>
+          </a:p>
+        </p:txBody>
+      </p:sp>
+      <p:sp>
+        <p:nvSpPr>
+          <p:cNvPr id="4" name="Footer Placeholder 3"/>
+          <p:cNvSpPr>
+            <a:spLocks noGrp="1"/>
+          </p:cNvSpPr>
+          <p:nvPr>
+            <p:ph type="ftr" sz="quarter" idx="11"/>
+          </p:nvPr>
+        </p:nvSpPr>
+        <p:spPr/>
+        <p:txBody>
+          <a:bodyPr/>
+          <a:lstStyle/>
+          <a:p>
+            <a:r>
+              <a:rPr lang="en-US" dirty="0" smtClean="0"/>
+              <a:t>STTR AF13-AT08 Storyboard</a:t>
+            </a:r>
+            <a:endParaRPr lang="en-US" dirty="0"/>
+          </a:p>
+        </p:txBody>
+      </p:sp>
+      <p:sp>
+        <p:nvSpPr>
+          <p:cNvPr id="5" name="Slide Number Placeholder 4"/>
+          <p:cNvSpPr>
+            <a:spLocks noGrp="1"/>
+          </p:cNvSpPr>
+          <p:nvPr>
+            <p:ph type="sldNum" sz="quarter" idx="12"/>
+          </p:nvPr>
+        </p:nvSpPr>
+        <p:spPr/>
+        <p:txBody>
+          <a:bodyPr/>
+          <a:lstStyle/>
+          <a:p>
+            <a:fld id="{61793996-2A25-4CAE-9F26-AD44D986CDD6}" type="slidenum">
+              <a:rPr lang="en-US" smtClean="0"/>
+              <a:t>25</a:t>
+            </a:fld>
+            <a:endParaRPr lang="en-US"/>
+          </a:p>
+        </p:txBody>
+      </p:sp>
+    </p:spTree>
+    <p:extLst>
+      <p:ext uri="{BB962C8B-B14F-4D97-AF65-F5344CB8AC3E}">
+        <p14:creationId xmlns:p14="http://schemas.microsoft.com/office/powerpoint/2010/main" val="1359215833"/>
+      </p:ext>
+    </p:extLst>
+  </p:cSld>
+  <p:clrMapOvr>
+    <a:masterClrMapping/>
+  </p:clrMapOvr>
+  <p:timing>
+    <p:tnLst>
+      <p:par>
+        <p:cTn id="1" dur="indefinite" restart="never" nodeType="tmRoot"/>
+      </p:par>
+    </p:tnLst>
+  </p:timing>
+</p:sld>
+</file>
+
+<file path=ppt/slides/slide26.xml><?xml version="1.0" encoding="utf-8"?>
+<p:sld xmlns:a="http://schemas.openxmlformats.org/drawingml/2006/main" xmlns:r="http://schemas.openxmlformats.org/officeDocument/2006/relationships" xmlns:p="http://schemas.openxmlformats.org/presentationml/2006/main">
+  <p:cSld>
+    <p:spTree>
+      <p:nvGrpSpPr>
+        <p:cNvPr id="1" name=""/>
+        <p:cNvGrpSpPr/>
+        <p:nvPr/>
+      </p:nvGrpSpPr>
+      <p:grpSpPr>
+        <a:xfrm>
+          <a:off x="0" y="0"/>
+          <a:ext cx="0" cy="0"/>
+          <a:chOff x="0" y="0"/>
+          <a:chExt cx="0" cy="0"/>
+        </a:xfrm>
+      </p:grpSpPr>
+      <p:sp>
+        <p:nvSpPr>
+          <p:cNvPr id="2" name="Title 1"/>
+          <p:cNvSpPr>
+            <a:spLocks noGrp="1"/>
+          </p:cNvSpPr>
+          <p:nvPr>
+            <p:ph type="title"/>
+          </p:nvPr>
+        </p:nvSpPr>
+        <p:spPr/>
+        <p:txBody>
           <a:bodyPr>
             <a:normAutofit fontScale="90000"/>
           </a:bodyPr>
@@ -6462,7 +6713,7 @@
           <a:p>
             <a:fld id="{61793996-2A25-4CAE-9F26-AD44D986CDD6}" type="slidenum">
               <a:rPr lang="en-US" smtClean="0"/>
-              <a:t>24</a:t>
+              <a:t>26</a:t>
             </a:fld>
             <a:endParaRPr lang="en-US"/>
           </a:p>
@@ -7582,15 +7833,7 @@
           <a:p>
             <a:r>
               <a:rPr lang="en-US" dirty="0" smtClean="0"/>
-              <a:t>STTR </a:t>
-            </a:r>
-            <a:r>
-              <a:rPr lang="en-US" dirty="0" smtClean="0"/>
-              <a:t>AF13-AT08 </a:t>
-            </a:r>
-            <a:r>
-              <a:rPr lang="en-US" dirty="0" smtClean="0"/>
-              <a:t>Storyboard</a:t>
+              <a:t>STTR AF13-AT08 Storyboard</a:t>
             </a:r>
             <a:endParaRPr lang="en-US" dirty="0"/>
           </a:p>

</xml_diff>